<commit_message>
testing out grid and list buttons for home
</commit_message>
<xml_diff>
--- a/Sitemap ect.pptx
+++ b/Sitemap ect.pptx
@@ -335,7 +335,7 @@
           <a:p>
             <a:fld id="{4DAFBDD3-A15C-4955-8CA3-3D8B5691D9F0}" type="datetimeFigureOut">
               <a:rPr lang="en-US" smtClean="0"/>
-              <a:t>10/25/2023</a:t>
+              <a:t>11/17/2023</a:t>
             </a:fld>
             <a:endParaRPr lang="en-US"/>
           </a:p>
@@ -533,7 +533,7 @@
           <a:p>
             <a:fld id="{4DAFBDD3-A15C-4955-8CA3-3D8B5691D9F0}" type="datetimeFigureOut">
               <a:rPr lang="en-US" smtClean="0"/>
-              <a:t>10/25/2023</a:t>
+              <a:t>11/17/2023</a:t>
             </a:fld>
             <a:endParaRPr lang="en-US"/>
           </a:p>
@@ -741,7 +741,7 @@
           <a:p>
             <a:fld id="{4DAFBDD3-A15C-4955-8CA3-3D8B5691D9F0}" type="datetimeFigureOut">
               <a:rPr lang="en-US" smtClean="0"/>
-              <a:t>10/25/2023</a:t>
+              <a:t>11/17/2023</a:t>
             </a:fld>
             <a:endParaRPr lang="en-US"/>
           </a:p>
@@ -939,7 +939,7 @@
           <a:p>
             <a:fld id="{4DAFBDD3-A15C-4955-8CA3-3D8B5691D9F0}" type="datetimeFigureOut">
               <a:rPr lang="en-US" smtClean="0"/>
-              <a:t>10/25/2023</a:t>
+              <a:t>11/17/2023</a:t>
             </a:fld>
             <a:endParaRPr lang="en-US"/>
           </a:p>
@@ -1214,7 +1214,7 @@
           <a:p>
             <a:fld id="{4DAFBDD3-A15C-4955-8CA3-3D8B5691D9F0}" type="datetimeFigureOut">
               <a:rPr lang="en-US" smtClean="0"/>
-              <a:t>10/25/2023</a:t>
+              <a:t>11/17/2023</a:t>
             </a:fld>
             <a:endParaRPr lang="en-US"/>
           </a:p>
@@ -1479,7 +1479,7 @@
           <a:p>
             <a:fld id="{4DAFBDD3-A15C-4955-8CA3-3D8B5691D9F0}" type="datetimeFigureOut">
               <a:rPr lang="en-US" smtClean="0"/>
-              <a:t>10/25/2023</a:t>
+              <a:t>11/17/2023</a:t>
             </a:fld>
             <a:endParaRPr lang="en-US"/>
           </a:p>
@@ -1891,7 +1891,7 @@
           <a:p>
             <a:fld id="{4DAFBDD3-A15C-4955-8CA3-3D8B5691D9F0}" type="datetimeFigureOut">
               <a:rPr lang="en-US" smtClean="0"/>
-              <a:t>10/25/2023</a:t>
+              <a:t>11/17/2023</a:t>
             </a:fld>
             <a:endParaRPr lang="en-US"/>
           </a:p>
@@ -2032,7 +2032,7 @@
           <a:p>
             <a:fld id="{4DAFBDD3-A15C-4955-8CA3-3D8B5691D9F0}" type="datetimeFigureOut">
               <a:rPr lang="en-US" smtClean="0"/>
-              <a:t>10/25/2023</a:t>
+              <a:t>11/17/2023</a:t>
             </a:fld>
             <a:endParaRPr lang="en-US"/>
           </a:p>
@@ -2145,7 +2145,7 @@
           <a:p>
             <a:fld id="{4DAFBDD3-A15C-4955-8CA3-3D8B5691D9F0}" type="datetimeFigureOut">
               <a:rPr lang="en-US" smtClean="0"/>
-              <a:t>10/25/2023</a:t>
+              <a:t>11/17/2023</a:t>
             </a:fld>
             <a:endParaRPr lang="en-US"/>
           </a:p>
@@ -2456,7 +2456,7 @@
           <a:p>
             <a:fld id="{4DAFBDD3-A15C-4955-8CA3-3D8B5691D9F0}" type="datetimeFigureOut">
               <a:rPr lang="en-US" smtClean="0"/>
-              <a:t>10/25/2023</a:t>
+              <a:t>11/17/2023</a:t>
             </a:fld>
             <a:endParaRPr lang="en-US"/>
           </a:p>
@@ -2744,7 +2744,7 @@
           <a:p>
             <a:fld id="{4DAFBDD3-A15C-4955-8CA3-3D8B5691D9F0}" type="datetimeFigureOut">
               <a:rPr lang="en-US" smtClean="0"/>
-              <a:t>10/25/2023</a:t>
+              <a:t>11/17/2023</a:t>
             </a:fld>
             <a:endParaRPr lang="en-US"/>
           </a:p>
@@ -2985,7 +2985,7 @@
           <a:p>
             <a:fld id="{4DAFBDD3-A15C-4955-8CA3-3D8B5691D9F0}" type="datetimeFigureOut">
               <a:rPr lang="en-US" smtClean="0"/>
-              <a:t>10/25/2023</a:t>
+              <a:t>11/17/2023</a:t>
             </a:fld>
             <a:endParaRPr lang="en-US"/>
           </a:p>
@@ -9360,7 +9360,7 @@
             <a:avLst/>
           </a:prstGeom>
           <a:solidFill>
-            <a:srgbClr val="EF4056"/>
+            <a:srgbClr val="8B0015"/>
           </a:solidFill>
           <a:ln>
             <a:noFill/>
@@ -9464,7 +9464,7 @@
         <p:spPr>
           <a:xfrm>
             <a:off x="4385349" y="2842183"/>
-            <a:ext cx="1459685" cy="369332"/>
+            <a:ext cx="1570837" cy="369332"/>
           </a:xfrm>
           <a:prstGeom prst="rect">
             <a:avLst/>
@@ -9480,7 +9480,7 @@
             <a:pPr algn="ctr"/>
             <a:r>
               <a:rPr lang="en-US" dirty="0"/>
-              <a:t>Hex: #EF4056</a:t>
+              <a:t>Hex: #8B0015</a:t>
             </a:r>
           </a:p>
         </p:txBody>

</xml_diff>

<commit_message>
added a fab to home page
</commit_message>
<xml_diff>
--- a/Sitemap ect.pptx
+++ b/Sitemap ect.pptx
@@ -335,7 +335,7 @@
           <a:p>
             <a:fld id="{4DAFBDD3-A15C-4955-8CA3-3D8B5691D9F0}" type="datetimeFigureOut">
               <a:rPr lang="en-US" smtClean="0"/>
-              <a:t>10/25/2023</a:t>
+              <a:t>11/19/2023</a:t>
             </a:fld>
             <a:endParaRPr lang="en-US"/>
           </a:p>
@@ -533,7 +533,7 @@
           <a:p>
             <a:fld id="{4DAFBDD3-A15C-4955-8CA3-3D8B5691D9F0}" type="datetimeFigureOut">
               <a:rPr lang="en-US" smtClean="0"/>
-              <a:t>10/25/2023</a:t>
+              <a:t>11/19/2023</a:t>
             </a:fld>
             <a:endParaRPr lang="en-US"/>
           </a:p>
@@ -741,7 +741,7 @@
           <a:p>
             <a:fld id="{4DAFBDD3-A15C-4955-8CA3-3D8B5691D9F0}" type="datetimeFigureOut">
               <a:rPr lang="en-US" smtClean="0"/>
-              <a:t>10/25/2023</a:t>
+              <a:t>11/19/2023</a:t>
             </a:fld>
             <a:endParaRPr lang="en-US"/>
           </a:p>
@@ -939,7 +939,7 @@
           <a:p>
             <a:fld id="{4DAFBDD3-A15C-4955-8CA3-3D8B5691D9F0}" type="datetimeFigureOut">
               <a:rPr lang="en-US" smtClean="0"/>
-              <a:t>10/25/2023</a:t>
+              <a:t>11/19/2023</a:t>
             </a:fld>
             <a:endParaRPr lang="en-US"/>
           </a:p>
@@ -1214,7 +1214,7 @@
           <a:p>
             <a:fld id="{4DAFBDD3-A15C-4955-8CA3-3D8B5691D9F0}" type="datetimeFigureOut">
               <a:rPr lang="en-US" smtClean="0"/>
-              <a:t>10/25/2023</a:t>
+              <a:t>11/19/2023</a:t>
             </a:fld>
             <a:endParaRPr lang="en-US"/>
           </a:p>
@@ -1479,7 +1479,7 @@
           <a:p>
             <a:fld id="{4DAFBDD3-A15C-4955-8CA3-3D8B5691D9F0}" type="datetimeFigureOut">
               <a:rPr lang="en-US" smtClean="0"/>
-              <a:t>10/25/2023</a:t>
+              <a:t>11/19/2023</a:t>
             </a:fld>
             <a:endParaRPr lang="en-US"/>
           </a:p>
@@ -1891,7 +1891,7 @@
           <a:p>
             <a:fld id="{4DAFBDD3-A15C-4955-8CA3-3D8B5691D9F0}" type="datetimeFigureOut">
               <a:rPr lang="en-US" smtClean="0"/>
-              <a:t>10/25/2023</a:t>
+              <a:t>11/19/2023</a:t>
             </a:fld>
             <a:endParaRPr lang="en-US"/>
           </a:p>
@@ -2032,7 +2032,7 @@
           <a:p>
             <a:fld id="{4DAFBDD3-A15C-4955-8CA3-3D8B5691D9F0}" type="datetimeFigureOut">
               <a:rPr lang="en-US" smtClean="0"/>
-              <a:t>10/25/2023</a:t>
+              <a:t>11/19/2023</a:t>
             </a:fld>
             <a:endParaRPr lang="en-US"/>
           </a:p>
@@ -2145,7 +2145,7 @@
           <a:p>
             <a:fld id="{4DAFBDD3-A15C-4955-8CA3-3D8B5691D9F0}" type="datetimeFigureOut">
               <a:rPr lang="en-US" smtClean="0"/>
-              <a:t>10/25/2023</a:t>
+              <a:t>11/19/2023</a:t>
             </a:fld>
             <a:endParaRPr lang="en-US"/>
           </a:p>
@@ -2456,7 +2456,7 @@
           <a:p>
             <a:fld id="{4DAFBDD3-A15C-4955-8CA3-3D8B5691D9F0}" type="datetimeFigureOut">
               <a:rPr lang="en-US" smtClean="0"/>
-              <a:t>10/25/2023</a:t>
+              <a:t>11/19/2023</a:t>
             </a:fld>
             <a:endParaRPr lang="en-US"/>
           </a:p>
@@ -2744,7 +2744,7 @@
           <a:p>
             <a:fld id="{4DAFBDD3-A15C-4955-8CA3-3D8B5691D9F0}" type="datetimeFigureOut">
               <a:rPr lang="en-US" smtClean="0"/>
-              <a:t>10/25/2023</a:t>
+              <a:t>11/19/2023</a:t>
             </a:fld>
             <a:endParaRPr lang="en-US"/>
           </a:p>
@@ -2985,7 +2985,7 @@
           <a:p>
             <a:fld id="{4DAFBDD3-A15C-4955-8CA3-3D8B5691D9F0}" type="datetimeFigureOut">
               <a:rPr lang="en-US" smtClean="0"/>
-              <a:t>10/25/2023</a:t>
+              <a:t>11/19/2023</a:t>
             </a:fld>
             <a:endParaRPr lang="en-US"/>
           </a:p>
@@ -10898,9 +10898,12 @@
             <a:pPr algn="ctr"/>
             <a:r>
               <a:rPr lang="en-US"/>
-              <a:t>Login Page</a:t>
-            </a:r>
-            <a:endParaRPr lang="en-US" dirty="0"/>
+              <a:t>index </a:t>
+            </a:r>
+            <a:r>
+              <a:rPr lang="en-US" dirty="0"/>
+              <a:t>Page</a:t>
+            </a:r>
           </a:p>
         </p:txBody>
       </p:sp>

</xml_diff>